<commit_message>
hey links don't work so well, update the pptx
</commit_message>
<xml_diff>
--- a/doc/specs/#5000 - Process Model 2.0/Architecture-Presentation.pptx
+++ b/doc/specs/#5000 - Process Model 2.0/Architecture-Presentation.pptx
@@ -5,7 +5,7 @@
     <p:sldMasterId id="2147483648" r:id="rId1"/>
   </p:sldMasterIdLst>
   <p:notesMasterIdLst>
-    <p:notesMasterId r:id="rId22"/>
+    <p:notesMasterId r:id="rId23"/>
   </p:notesMasterIdLst>
   <p:sldIdLst>
     <p:sldId id="256" r:id="rId2"/>
@@ -25,9 +25,10 @@
     <p:sldId id="270" r:id="rId16"/>
     <p:sldId id="275" r:id="rId17"/>
     <p:sldId id="271" r:id="rId18"/>
-    <p:sldId id="272" r:id="rId19"/>
-    <p:sldId id="273" r:id="rId20"/>
-    <p:sldId id="274" r:id="rId21"/>
+    <p:sldId id="276" r:id="rId19"/>
+    <p:sldId id="272" r:id="rId20"/>
+    <p:sldId id="273" r:id="rId21"/>
+    <p:sldId id="274" r:id="rId22"/>
   </p:sldIdLst>
   <p:sldSz cx="12192000" cy="6858000"/>
   <p:notesSz cx="6858000" cy="12192000"/>
@@ -997,7 +998,7 @@
           <a:p>
             <a:fld id="{F7021451-1387-4CA6-816F-3879F97B5CBC}" type="slidenum">
               <a:rPr lang="en-US"/>
-              <a:t>18</a:t>
+              <a:t>19</a:t>
             </a:fld>
             <a:endParaRPr lang="en-US"/>
           </a:p>
@@ -1094,7 +1095,7 @@
           <a:p>
             <a:fld id="{F7021451-1387-4CA6-816F-3879F97B5CBC}" type="slidenum">
               <a:rPr lang="en-US"/>
-              <a:t>19</a:t>
+              <a:t>20</a:t>
             </a:fld>
             <a:endParaRPr lang="en-US"/>
           </a:p>
@@ -1178,7 +1179,7 @@
           <a:p>
             <a:fld id="{F7021451-1387-4CA6-816F-3879F97B5CBC}" type="slidenum">
               <a:rPr lang="en-US"/>
-              <a:t>20</a:t>
+              <a:t>21</a:t>
             </a:fld>
             <a:endParaRPr lang="en-US"/>
           </a:p>
@@ -2515,7 +2516,7 @@
 </file>
 
 <file path=ppt/slides/slide17.xml><?xml version="1.0" encoding="utf-8"?>
-<p:sld xmlns:a="http://schemas.openxmlformats.org/drawingml/2006/main" xmlns:r="http://schemas.openxmlformats.org/officeDocument/2006/relationships" xmlns:p="http://schemas.openxmlformats.org/presentationml/2006/main">
+<p:sld xmlns:a="http://schemas.openxmlformats.org/drawingml/2006/main" xmlns:r="http://schemas.openxmlformats.org/officeDocument/2006/relationships" xmlns:p="http://schemas.openxmlformats.org/presentationml/2006/main" show="0">
   <p:cSld name="Slide 16">
     <p:bg>
       <p:bgPr>
@@ -2555,36 +2556,161 @@
 
 <file path=ppt/slides/slide18.xml><?xml version="1.0" encoding="utf-8"?>
 <p:sld xmlns:a="http://schemas.openxmlformats.org/drawingml/2006/main" xmlns:r="http://schemas.openxmlformats.org/officeDocument/2006/relationships" xmlns:p="http://schemas.openxmlformats.org/presentationml/2006/main">
-  <p:cSld name="Slide 17">
-    <p:bg>
-      <p:bgPr>
-        <a:blipFill dpi="0" rotWithShape="1">
-          <a:blip r:embed="rId3">
-            <a:lum/>
-          </a:blip>
-          <a:srcRect/>
-          <a:stretch>
-            <a:fillRect/>
-          </a:stretch>
-        </a:blipFill>
-        <a:effectLst/>
-      </p:bgPr>
-    </p:bg>
-    <p:spTree>
-      <p:nvGrpSpPr>
-        <p:cNvPr id="1" name=""/>
-        <p:cNvGrpSpPr/>
-        <p:nvPr/>
-      </p:nvGrpSpPr>
-      <p:grpSpPr>
-        <a:xfrm>
-          <a:off x="0" y="0"/>
-          <a:ext cx="0" cy="0"/>
-          <a:chOff x="0" y="0"/>
-          <a:chExt cx="0" cy="0"/>
-        </a:xfrm>
-      </p:grpSpPr>
-    </p:spTree>
+  <p:cSld>
+    <p:spTree>
+      <p:nvGrpSpPr>
+        <p:cNvPr id="1" name=""/>
+        <p:cNvGrpSpPr/>
+        <p:nvPr/>
+      </p:nvGrpSpPr>
+      <p:grpSpPr>
+        <a:xfrm>
+          <a:off x="0" y="0"/>
+          <a:ext cx="0" cy="0"/>
+          <a:chOff x="0" y="0"/>
+          <a:chExt cx="0" cy="0"/>
+        </a:xfrm>
+      </p:grpSpPr>
+      <p:sp>
+        <p:nvSpPr>
+          <p:cNvPr id="2" name="TextBox 1">
+            <a:extLst>
+              <a:ext uri="{FF2B5EF4-FFF2-40B4-BE49-F238E27FC236}">
+                <a16:creationId xmlns:a16="http://schemas.microsoft.com/office/drawing/2014/main" id="{78466E5D-9746-2CF1-F59D-506C3518754D}"/>
+              </a:ext>
+            </a:extLst>
+          </p:cNvPr>
+          <p:cNvSpPr txBox="1"/>
+          <p:nvPr/>
+        </p:nvSpPr>
+        <p:spPr>
+          <a:xfrm>
+            <a:off x="604434" y="2041901"/>
+            <a:ext cx="4017936" cy="707886"/>
+          </a:xfrm>
+          <a:prstGeom prst="rect">
+            <a:avLst/>
+          </a:prstGeom>
+          <a:noFill/>
+        </p:spPr>
+        <p:txBody>
+          <a:bodyPr wrap="square" rtlCol="0">
+            <a:spAutoFit/>
+          </a:bodyPr>
+          <a:lstStyle/>
+          <a:p>
+            <a:r>
+              <a:rPr lang="en-US" sz="4000" dirty="0">
+                <a:solidFill>
+                  <a:schemeClr val="accent1">
+                    <a:lumMod val="75000"/>
+                  </a:schemeClr>
+                </a:solidFill>
+                <a:latin typeface="Microsoft YaHei UI" panose="020B0503020204020204" pitchFamily="34" charset="-122"/>
+                <a:ea typeface="Microsoft YaHei UI" panose="020B0503020204020204" pitchFamily="34" charset="-122"/>
+              </a:rPr>
+              <a:t>Questions</a:t>
+            </a:r>
+          </a:p>
+        </p:txBody>
+      </p:sp>
+      <p:sp>
+        <p:nvSpPr>
+          <p:cNvPr id="3" name="TextBox 2">
+            <a:extLst>
+              <a:ext uri="{FF2B5EF4-FFF2-40B4-BE49-F238E27FC236}">
+                <a16:creationId xmlns:a16="http://schemas.microsoft.com/office/drawing/2014/main" id="{C653B40F-4563-AFC7-38A1-622A4611C7D6}"/>
+              </a:ext>
+            </a:extLst>
+          </p:cNvPr>
+          <p:cNvSpPr txBox="1"/>
+          <p:nvPr/>
+        </p:nvSpPr>
+        <p:spPr>
+          <a:xfrm>
+            <a:off x="778790" y="2820692"/>
+            <a:ext cx="4870342" cy="1477328"/>
+          </a:xfrm>
+          <a:prstGeom prst="rect">
+            <a:avLst/>
+          </a:prstGeom>
+          <a:noFill/>
+        </p:spPr>
+        <p:txBody>
+          <a:bodyPr wrap="square" rtlCol="0">
+            <a:spAutoFit/>
+          </a:bodyPr>
+          <a:lstStyle/>
+          <a:p>
+            <a:r>
+              <a:rPr lang="en-US" dirty="0"/>
+              <a:t>Mike Griese (</a:t>
+            </a:r>
+            <a:r>
+              <a:rPr lang="en-US" dirty="0" err="1"/>
+              <a:t>migrie</a:t>
+            </a:r>
+            <a:r>
+              <a:rPr lang="en-US" dirty="0"/>
+              <a:t>)</a:t>
+            </a:r>
+          </a:p>
+          <a:p>
+            <a:r>
+              <a:rPr lang="en-US" dirty="0">
+                <a:hlinkClick r:id="rId2"/>
+              </a:rPr>
+              <a:t>@zadjii-msft</a:t>
+            </a:r>
+            <a:endParaRPr lang="en-US" dirty="0"/>
+          </a:p>
+          <a:p>
+            <a:r>
+              <a:rPr lang="en-US" dirty="0">
+                <a:hlinkClick r:id="rId3"/>
+              </a:rPr>
+              <a:t>Terminal Repo</a:t>
+            </a:r>
+            <a:endParaRPr lang="en-US" dirty="0"/>
+          </a:p>
+          <a:p>
+            <a:r>
+              <a:rPr lang="en-US" dirty="0">
+                <a:hlinkClick r:id="rId4"/>
+              </a:rPr>
+              <a:t>Original doc link</a:t>
+            </a:r>
+            <a:endParaRPr lang="en-US" dirty="0"/>
+          </a:p>
+          <a:p>
+            <a:r>
+              <a:rPr lang="en-US" dirty="0">
+                <a:hlinkClick r:id="rId5"/>
+              </a:rPr>
+              <a:t>Tracking issue (</a:t>
+            </a:r>
+            <a:r>
+              <a:rPr lang="en-US" dirty="0" err="1">
+                <a:hlinkClick r:id="rId5"/>
+              </a:rPr>
+              <a:t>microsoft</a:t>
+            </a:r>
+            <a:r>
+              <a:rPr lang="en-US" dirty="0">
+                <a:hlinkClick r:id="rId5"/>
+              </a:rPr>
+              <a:t>/terminal#5000)</a:t>
+            </a:r>
+            <a:endParaRPr lang="en-US" dirty="0"/>
+          </a:p>
+        </p:txBody>
+      </p:sp>
+    </p:spTree>
+    <p:extLst>
+      <p:ext uri="{BB962C8B-B14F-4D97-AF65-F5344CB8AC3E}">
+        <p14:creationId xmlns:p14="http://schemas.microsoft.com/office/powerpoint/2010/main" val="1136760673"/>
+      </p:ext>
+    </p:extLst>
   </p:cSld>
   <p:clrMapOvr>
     <a:masterClrMapping/>
@@ -2594,7 +2720,7 @@
 
 <file path=ppt/slides/slide19.xml><?xml version="1.0" encoding="utf-8"?>
 <p:sld xmlns:a="http://schemas.openxmlformats.org/drawingml/2006/main" xmlns:r="http://schemas.openxmlformats.org/officeDocument/2006/relationships" xmlns:p="http://schemas.openxmlformats.org/presentationml/2006/main">
-  <p:cSld name="Slide 18">
+  <p:cSld name="Slide 17">
     <p:bg>
       <p:bgPr>
         <a:blipFill dpi="0" rotWithShape="1">
@@ -2671,6 +2797,45 @@
 </file>
 
 <file path=ppt/slides/slide20.xml><?xml version="1.0" encoding="utf-8"?>
+<p:sld xmlns:a="http://schemas.openxmlformats.org/drawingml/2006/main" xmlns:r="http://schemas.openxmlformats.org/officeDocument/2006/relationships" xmlns:p="http://schemas.openxmlformats.org/presentationml/2006/main">
+  <p:cSld name="Slide 18">
+    <p:bg>
+      <p:bgPr>
+        <a:blipFill dpi="0" rotWithShape="1">
+          <a:blip r:embed="rId3">
+            <a:lum/>
+          </a:blip>
+          <a:srcRect/>
+          <a:stretch>
+            <a:fillRect/>
+          </a:stretch>
+        </a:blipFill>
+        <a:effectLst/>
+      </p:bgPr>
+    </p:bg>
+    <p:spTree>
+      <p:nvGrpSpPr>
+        <p:cNvPr id="1" name=""/>
+        <p:cNvGrpSpPr/>
+        <p:nvPr/>
+      </p:nvGrpSpPr>
+      <p:grpSpPr>
+        <a:xfrm>
+          <a:off x="0" y="0"/>
+          <a:ext cx="0" cy="0"/>
+          <a:chOff x="0" y="0"/>
+          <a:chExt cx="0" cy="0"/>
+        </a:xfrm>
+      </p:grpSpPr>
+    </p:spTree>
+  </p:cSld>
+  <p:clrMapOvr>
+    <a:masterClrMapping/>
+  </p:clrMapOvr>
+</p:sld>
+</file>
+
+<file path=ppt/slides/slide21.xml><?xml version="1.0" encoding="utf-8"?>
 <p:sld xmlns:a="http://schemas.openxmlformats.org/drawingml/2006/main" xmlns:r="http://schemas.openxmlformats.org/officeDocument/2006/relationships" xmlns:p="http://schemas.openxmlformats.org/presentationml/2006/main">
   <p:cSld name="Slide 19">
     <p:bg>

</xml_diff>